<commit_message>
done!! before the deadline too
</commit_message>
<xml_diff>
--- a/PS1/Yunqing_Jia_PS1.pptx
+++ b/PS1/Yunqing_Jia_PS1.pptx
@@ -1084,7 +1084,7 @@
         </p:nvSpPr>
         <p:spPr>
           <a:xfrm>
-            <a:off x="381300" y="685800"/>
+            <a:off x="381000" y="685800"/>
             <a:ext cx="6096000" cy="3429000"/>
           </a:xfrm>
           <a:custGeom>
@@ -1206,7 +1206,7 @@
         </p:nvSpPr>
         <p:spPr>
           <a:xfrm>
-            <a:off x="381300" y="685800"/>
+            <a:off x="381000" y="685800"/>
             <a:ext cx="6096000" cy="3429000"/>
           </a:xfrm>
           <a:custGeom>
@@ -10474,13 +10474,297 @@
               <a:buNone/>
             </a:pPr>
             <a:r>
-              <a:rPr lang="en"/>
-              <a:t>&lt;Insert plots here&gt;</a:t>
+              <a:rPr lang="en-US" dirty="0"/>
+              <a:t>	         R			    G		                  B</a:t>
             </a:r>
-            <a:endParaRPr/>
+          </a:p>
+          <a:p>
+            <a:pPr marL="0" lvl="0" indent="0" algn="l" rtl="0">
+              <a:lnSpc>
+                <a:spcPct val="115000"/>
+              </a:lnSpc>
+              <a:spcBef>
+                <a:spcPts val="0"/>
+              </a:spcBef>
+              <a:spcAft>
+                <a:spcPts val="1600"/>
+              </a:spcAft>
+              <a:buSzPts val="1400"/>
+              <a:buNone/>
+            </a:pPr>
+            <a:endParaRPr lang="en-US" dirty="0"/>
+          </a:p>
+          <a:p>
+            <a:pPr marL="0" lvl="0" indent="0" algn="l" rtl="0">
+              <a:lnSpc>
+                <a:spcPct val="115000"/>
+              </a:lnSpc>
+              <a:spcBef>
+                <a:spcPts val="0"/>
+              </a:spcBef>
+              <a:spcAft>
+                <a:spcPts val="1600"/>
+              </a:spcAft>
+              <a:buSzPts val="1400"/>
+              <a:buNone/>
+            </a:pPr>
+            <a:r>
+              <a:rPr lang="en-US" dirty="0"/>
+              <a:t>Indoor</a:t>
+            </a:r>
+          </a:p>
+          <a:p>
+            <a:pPr marL="0" lvl="0" indent="0" algn="l" rtl="0">
+              <a:lnSpc>
+                <a:spcPct val="115000"/>
+              </a:lnSpc>
+              <a:spcBef>
+                <a:spcPts val="0"/>
+              </a:spcBef>
+              <a:spcAft>
+                <a:spcPts val="1600"/>
+              </a:spcAft>
+              <a:buSzPts val="1400"/>
+              <a:buNone/>
+            </a:pPr>
+            <a:endParaRPr lang="en-US" dirty="0"/>
+          </a:p>
+          <a:p>
+            <a:pPr marL="0" lvl="0" indent="0" algn="l" rtl="0">
+              <a:lnSpc>
+                <a:spcPct val="115000"/>
+              </a:lnSpc>
+              <a:spcBef>
+                <a:spcPts val="0"/>
+              </a:spcBef>
+              <a:spcAft>
+                <a:spcPts val="1600"/>
+              </a:spcAft>
+              <a:buSzPts val="1400"/>
+              <a:buNone/>
+            </a:pPr>
+            <a:endParaRPr lang="en-US" dirty="0"/>
+          </a:p>
+          <a:p>
+            <a:pPr marL="0" lvl="0" indent="0" algn="l" rtl="0">
+              <a:lnSpc>
+                <a:spcPct val="115000"/>
+              </a:lnSpc>
+              <a:spcBef>
+                <a:spcPts val="0"/>
+              </a:spcBef>
+              <a:spcAft>
+                <a:spcPts val="1600"/>
+              </a:spcAft>
+              <a:buSzPts val="1400"/>
+              <a:buNone/>
+            </a:pPr>
+            <a:endParaRPr lang="en-US" dirty="0"/>
+          </a:p>
+          <a:p>
+            <a:pPr marL="0" lvl="0" indent="0" algn="l" rtl="0">
+              <a:lnSpc>
+                <a:spcPct val="115000"/>
+              </a:lnSpc>
+              <a:spcBef>
+                <a:spcPts val="0"/>
+              </a:spcBef>
+              <a:spcAft>
+                <a:spcPts val="1600"/>
+              </a:spcAft>
+              <a:buSzPts val="1400"/>
+              <a:buNone/>
+            </a:pPr>
+            <a:r>
+              <a:rPr lang="en-US" dirty="0"/>
+              <a:t>Outdoor</a:t>
+            </a:r>
           </a:p>
         </p:txBody>
       </p:sp>
+      <p:pic>
+        <p:nvPicPr>
+          <p:cNvPr id="9" name="Picture 8" descr="R">
+            <a:extLst>
+              <a:ext uri="{FF2B5EF4-FFF2-40B4-BE49-F238E27FC236}">
+                <a16:creationId xmlns:a16="http://schemas.microsoft.com/office/drawing/2014/main" id="{A6315DD6-2AD9-4E06-B155-924BF682A637}"/>
+              </a:ext>
+              <a:ext uri="{C183D7F6-B498-43B3-948B-1728B52AA6E4}">
+                <adec:decorative xmlns:adec="http://schemas.microsoft.com/office/drawing/2017/decorative" val="0"/>
+              </a:ext>
+            </a:extLst>
+          </p:cNvPr>
+          <p:cNvPicPr>
+            <a:picLocks noChangeAspect="1"/>
+          </p:cNvPicPr>
+          <p:nvPr/>
+        </p:nvPicPr>
+        <p:blipFill>
+          <a:blip r:embed="rId3"/>
+          <a:stretch>
+            <a:fillRect/>
+          </a:stretch>
+        </p:blipFill>
+        <p:spPr>
+          <a:xfrm>
+            <a:off x="1746688" y="1695557"/>
+            <a:ext cx="1360829" cy="1371600"/>
+          </a:xfrm>
+          <a:prstGeom prst="rect">
+            <a:avLst/>
+          </a:prstGeom>
+        </p:spPr>
+      </p:pic>
+      <p:pic>
+        <p:nvPicPr>
+          <p:cNvPr id="11" name="Picture 10" descr="A picture containing indoor, window, electronics, keyboard&#10;&#10;Description automatically generated">
+            <a:extLst>
+              <a:ext uri="{FF2B5EF4-FFF2-40B4-BE49-F238E27FC236}">
+                <a16:creationId xmlns:a16="http://schemas.microsoft.com/office/drawing/2014/main" id="{162A4894-98FC-48D4-99FA-B70A9522B17E}"/>
+              </a:ext>
+            </a:extLst>
+          </p:cNvPr>
+          <p:cNvPicPr>
+            <a:picLocks noChangeAspect="1"/>
+          </p:cNvPicPr>
+          <p:nvPr/>
+        </p:nvPicPr>
+        <p:blipFill>
+          <a:blip r:embed="rId4"/>
+          <a:stretch>
+            <a:fillRect/>
+          </a:stretch>
+        </p:blipFill>
+        <p:spPr>
+          <a:xfrm>
+            <a:off x="4256421" y="1695557"/>
+            <a:ext cx="1360829" cy="1371600"/>
+          </a:xfrm>
+          <a:prstGeom prst="rect">
+            <a:avLst/>
+          </a:prstGeom>
+        </p:spPr>
+      </p:pic>
+      <p:pic>
+        <p:nvPicPr>
+          <p:cNvPr id="13" name="Picture 12" descr="A picture containing indoor, white&#10;&#10;Description automatically generated">
+            <a:extLst>
+              <a:ext uri="{FF2B5EF4-FFF2-40B4-BE49-F238E27FC236}">
+                <a16:creationId xmlns:a16="http://schemas.microsoft.com/office/drawing/2014/main" id="{5128B404-1D5D-4BA6-9B66-09CD3C6AFF7F}"/>
+              </a:ext>
+            </a:extLst>
+          </p:cNvPr>
+          <p:cNvPicPr>
+            <a:picLocks noChangeAspect="1"/>
+          </p:cNvPicPr>
+          <p:nvPr/>
+        </p:nvPicPr>
+        <p:blipFill>
+          <a:blip r:embed="rId5"/>
+          <a:stretch>
+            <a:fillRect/>
+          </a:stretch>
+        </p:blipFill>
+        <p:spPr>
+          <a:xfrm>
+            <a:off x="6766155" y="1695557"/>
+            <a:ext cx="1360829" cy="1371600"/>
+          </a:xfrm>
+          <a:prstGeom prst="rect">
+            <a:avLst/>
+          </a:prstGeom>
+        </p:spPr>
+      </p:pic>
+      <p:pic>
+        <p:nvPicPr>
+          <p:cNvPr id="15" name="Picture 14" descr="A picture containing window, indoor&#10;&#10;Description automatically generated">
+            <a:extLst>
+              <a:ext uri="{FF2B5EF4-FFF2-40B4-BE49-F238E27FC236}">
+                <a16:creationId xmlns:a16="http://schemas.microsoft.com/office/drawing/2014/main" id="{842ABEC6-8A72-4E7A-A00C-8E9FE29C6D5C}"/>
+              </a:ext>
+            </a:extLst>
+          </p:cNvPr>
+          <p:cNvPicPr>
+            <a:picLocks noChangeAspect="1"/>
+          </p:cNvPicPr>
+          <p:nvPr/>
+        </p:nvPicPr>
+        <p:blipFill>
+          <a:blip r:embed="rId6"/>
+          <a:stretch>
+            <a:fillRect/>
+          </a:stretch>
+        </p:blipFill>
+        <p:spPr>
+          <a:xfrm>
+            <a:off x="1746688" y="3492104"/>
+            <a:ext cx="1339866" cy="1371600"/>
+          </a:xfrm>
+          <a:prstGeom prst="rect">
+            <a:avLst/>
+          </a:prstGeom>
+        </p:spPr>
+      </p:pic>
+      <p:pic>
+        <p:nvPicPr>
+          <p:cNvPr id="17" name="Picture 16" descr="A picture containing window, indoor, old&#10;&#10;Description automatically generated">
+            <a:extLst>
+              <a:ext uri="{FF2B5EF4-FFF2-40B4-BE49-F238E27FC236}">
+                <a16:creationId xmlns:a16="http://schemas.microsoft.com/office/drawing/2014/main" id="{9390C5CF-51A4-48EE-B360-DA47E3EE497C}"/>
+              </a:ext>
+            </a:extLst>
+          </p:cNvPr>
+          <p:cNvPicPr>
+            <a:picLocks noChangeAspect="1"/>
+          </p:cNvPicPr>
+          <p:nvPr/>
+        </p:nvPicPr>
+        <p:blipFill>
+          <a:blip r:embed="rId7"/>
+          <a:stretch>
+            <a:fillRect/>
+          </a:stretch>
+        </p:blipFill>
+        <p:spPr>
+          <a:xfrm>
+            <a:off x="4256421" y="3492104"/>
+            <a:ext cx="1339866" cy="1371600"/>
+          </a:xfrm>
+          <a:prstGeom prst="rect">
+            <a:avLst/>
+          </a:prstGeom>
+        </p:spPr>
+      </p:pic>
+      <p:pic>
+        <p:nvPicPr>
+          <p:cNvPr id="19" name="Picture 18" descr="A picture containing indoor, window&#10;&#10;Description automatically generated">
+            <a:extLst>
+              <a:ext uri="{FF2B5EF4-FFF2-40B4-BE49-F238E27FC236}">
+                <a16:creationId xmlns:a16="http://schemas.microsoft.com/office/drawing/2014/main" id="{5384CE3E-86A5-4C79-A939-EA62D82D4195}"/>
+              </a:ext>
+            </a:extLst>
+          </p:cNvPr>
+          <p:cNvPicPr>
+            <a:picLocks noChangeAspect="1"/>
+          </p:cNvPicPr>
+          <p:nvPr/>
+        </p:nvPicPr>
+        <p:blipFill>
+          <a:blip r:embed="rId8"/>
+          <a:stretch>
+            <a:fillRect/>
+          </a:stretch>
+        </p:blipFill>
+        <p:spPr>
+          <a:xfrm>
+            <a:off x="6766154" y="3492104"/>
+            <a:ext cx="1339866" cy="1371600"/>
+          </a:xfrm>
+          <a:prstGeom prst="rect">
+            <a:avLst/>
+          </a:prstGeom>
+        </p:spPr>
+      </p:pic>
     </p:spTree>
   </p:cSld>
   <p:clrMapOvr>
@@ -10616,13 +10900,294 @@
               <a:buNone/>
             </a:pPr>
             <a:r>
-              <a:rPr lang="en" dirty="0"/>
-              <a:t>&lt;Insert plots here&gt;</a:t>
+              <a:rPr lang="en-US" dirty="0"/>
+              <a:t>	         L			    A		                  B</a:t>
             </a:r>
-            <a:endParaRPr dirty="0"/>
+          </a:p>
+          <a:p>
+            <a:pPr marL="0" lvl="0" indent="0" algn="l" rtl="0">
+              <a:lnSpc>
+                <a:spcPct val="115000"/>
+              </a:lnSpc>
+              <a:spcBef>
+                <a:spcPts val="0"/>
+              </a:spcBef>
+              <a:spcAft>
+                <a:spcPts val="1600"/>
+              </a:spcAft>
+              <a:buSzPts val="1400"/>
+              <a:buNone/>
+            </a:pPr>
+            <a:endParaRPr lang="en-US" dirty="0"/>
+          </a:p>
+          <a:p>
+            <a:pPr marL="0" lvl="0" indent="0" algn="l" rtl="0">
+              <a:lnSpc>
+                <a:spcPct val="115000"/>
+              </a:lnSpc>
+              <a:spcBef>
+                <a:spcPts val="0"/>
+              </a:spcBef>
+              <a:spcAft>
+                <a:spcPts val="1600"/>
+              </a:spcAft>
+              <a:buSzPts val="1400"/>
+              <a:buNone/>
+            </a:pPr>
+            <a:r>
+              <a:rPr lang="en-US" dirty="0"/>
+              <a:t>Indoor</a:t>
+            </a:r>
+          </a:p>
+          <a:p>
+            <a:pPr marL="0" lvl="0" indent="0" algn="l" rtl="0">
+              <a:lnSpc>
+                <a:spcPct val="115000"/>
+              </a:lnSpc>
+              <a:spcBef>
+                <a:spcPts val="0"/>
+              </a:spcBef>
+              <a:spcAft>
+                <a:spcPts val="1600"/>
+              </a:spcAft>
+              <a:buSzPts val="1400"/>
+              <a:buNone/>
+            </a:pPr>
+            <a:endParaRPr lang="en-US" dirty="0"/>
+          </a:p>
+          <a:p>
+            <a:pPr marL="0" lvl="0" indent="0" algn="l" rtl="0">
+              <a:lnSpc>
+                <a:spcPct val="115000"/>
+              </a:lnSpc>
+              <a:spcBef>
+                <a:spcPts val="0"/>
+              </a:spcBef>
+              <a:spcAft>
+                <a:spcPts val="1600"/>
+              </a:spcAft>
+              <a:buSzPts val="1400"/>
+              <a:buNone/>
+            </a:pPr>
+            <a:endParaRPr lang="en-US" dirty="0"/>
+          </a:p>
+          <a:p>
+            <a:pPr marL="0" lvl="0" indent="0" algn="l" rtl="0">
+              <a:lnSpc>
+                <a:spcPct val="115000"/>
+              </a:lnSpc>
+              <a:spcBef>
+                <a:spcPts val="0"/>
+              </a:spcBef>
+              <a:spcAft>
+                <a:spcPts val="1600"/>
+              </a:spcAft>
+              <a:buSzPts val="1400"/>
+              <a:buNone/>
+            </a:pPr>
+            <a:endParaRPr lang="en-US" dirty="0"/>
+          </a:p>
+          <a:p>
+            <a:pPr marL="0" lvl="0" indent="0" algn="l" rtl="0">
+              <a:lnSpc>
+                <a:spcPct val="115000"/>
+              </a:lnSpc>
+              <a:spcBef>
+                <a:spcPts val="0"/>
+              </a:spcBef>
+              <a:spcAft>
+                <a:spcPts val="1600"/>
+              </a:spcAft>
+              <a:buSzPts val="1400"/>
+              <a:buNone/>
+            </a:pPr>
+            <a:r>
+              <a:rPr lang="en-US" dirty="0"/>
+              <a:t>Outdoor</a:t>
+            </a:r>
           </a:p>
         </p:txBody>
       </p:sp>
+      <p:pic>
+        <p:nvPicPr>
+          <p:cNvPr id="3" name="Picture 2" descr="A picture containing window, electronics&#10;&#10;Description automatically generated">
+            <a:extLst>
+              <a:ext uri="{FF2B5EF4-FFF2-40B4-BE49-F238E27FC236}">
+                <a16:creationId xmlns:a16="http://schemas.microsoft.com/office/drawing/2014/main" id="{B5EF160E-7E5C-4515-885B-9AC80D3A6DF7}"/>
+              </a:ext>
+            </a:extLst>
+          </p:cNvPr>
+          <p:cNvPicPr>
+            <a:picLocks noChangeAspect="1"/>
+          </p:cNvPicPr>
+          <p:nvPr/>
+        </p:nvPicPr>
+        <p:blipFill>
+          <a:blip r:embed="rId3"/>
+          <a:stretch>
+            <a:fillRect/>
+          </a:stretch>
+        </p:blipFill>
+        <p:spPr>
+          <a:xfrm>
+            <a:off x="1703135" y="1700849"/>
+            <a:ext cx="1360828" cy="1371600"/>
+          </a:xfrm>
+          <a:prstGeom prst="rect">
+            <a:avLst/>
+          </a:prstGeom>
+        </p:spPr>
+      </p:pic>
+      <p:pic>
+        <p:nvPicPr>
+          <p:cNvPr id="6" name="Picture 5" descr="A picture containing window, white&#10;&#10;Description automatically generated">
+            <a:extLst>
+              <a:ext uri="{FF2B5EF4-FFF2-40B4-BE49-F238E27FC236}">
+                <a16:creationId xmlns:a16="http://schemas.microsoft.com/office/drawing/2014/main" id="{F53C8900-F29A-4558-BFBE-BEDF2CB14A3B}"/>
+              </a:ext>
+            </a:extLst>
+          </p:cNvPr>
+          <p:cNvPicPr>
+            <a:picLocks noChangeAspect="1"/>
+          </p:cNvPicPr>
+          <p:nvPr/>
+        </p:nvPicPr>
+        <p:blipFill>
+          <a:blip r:embed="rId4"/>
+          <a:stretch>
+            <a:fillRect/>
+          </a:stretch>
+        </p:blipFill>
+        <p:spPr>
+          <a:xfrm>
+            <a:off x="4196954" y="1700849"/>
+            <a:ext cx="1360828" cy="1371600"/>
+          </a:xfrm>
+          <a:prstGeom prst="rect">
+            <a:avLst/>
+          </a:prstGeom>
+        </p:spPr>
+      </p:pic>
+      <p:pic>
+        <p:nvPicPr>
+          <p:cNvPr id="8" name="Picture 7">
+            <a:extLst>
+              <a:ext uri="{FF2B5EF4-FFF2-40B4-BE49-F238E27FC236}">
+                <a16:creationId xmlns:a16="http://schemas.microsoft.com/office/drawing/2014/main" id="{667C089F-D68B-412F-8FAE-EF74CED0EAD1}"/>
+              </a:ext>
+            </a:extLst>
+          </p:cNvPr>
+          <p:cNvPicPr>
+            <a:picLocks noChangeAspect="1"/>
+          </p:cNvPicPr>
+          <p:nvPr/>
+        </p:nvPicPr>
+        <p:blipFill>
+          <a:blip r:embed="rId5"/>
+          <a:stretch>
+            <a:fillRect/>
+          </a:stretch>
+        </p:blipFill>
+        <p:spPr>
+          <a:xfrm>
+            <a:off x="6760451" y="1700849"/>
+            <a:ext cx="1360828" cy="1371600"/>
+          </a:xfrm>
+          <a:prstGeom prst="rect">
+            <a:avLst/>
+          </a:prstGeom>
+        </p:spPr>
+      </p:pic>
+      <p:pic>
+        <p:nvPicPr>
+          <p:cNvPr id="10" name="Picture 9" descr="A picture containing window, indoor, old&#10;&#10;Description automatically generated">
+            <a:extLst>
+              <a:ext uri="{FF2B5EF4-FFF2-40B4-BE49-F238E27FC236}">
+                <a16:creationId xmlns:a16="http://schemas.microsoft.com/office/drawing/2014/main" id="{0FD89D59-B541-4DAF-9B8B-3FABB1F3B89C}"/>
+              </a:ext>
+            </a:extLst>
+          </p:cNvPr>
+          <p:cNvPicPr>
+            <a:picLocks noChangeAspect="1"/>
+          </p:cNvPicPr>
+          <p:nvPr/>
+        </p:nvPicPr>
+        <p:blipFill>
+          <a:blip r:embed="rId6"/>
+          <a:stretch>
+            <a:fillRect/>
+          </a:stretch>
+        </p:blipFill>
+        <p:spPr>
+          <a:xfrm>
+            <a:off x="1697185" y="3326875"/>
+            <a:ext cx="1339867" cy="1371600"/>
+          </a:xfrm>
+          <a:prstGeom prst="rect">
+            <a:avLst/>
+          </a:prstGeom>
+        </p:spPr>
+      </p:pic>
+      <p:pic>
+        <p:nvPicPr>
+          <p:cNvPr id="12" name="Picture 11" descr="A picture containing window&#10;&#10;Description automatically generated">
+            <a:extLst>
+              <a:ext uri="{FF2B5EF4-FFF2-40B4-BE49-F238E27FC236}">
+                <a16:creationId xmlns:a16="http://schemas.microsoft.com/office/drawing/2014/main" id="{0B902CBA-0B48-497E-8095-E372C8C4FD0E}"/>
+              </a:ext>
+            </a:extLst>
+          </p:cNvPr>
+          <p:cNvPicPr>
+            <a:picLocks noChangeAspect="1"/>
+          </p:cNvPicPr>
+          <p:nvPr/>
+        </p:nvPicPr>
+        <p:blipFill>
+          <a:blip r:embed="rId7"/>
+          <a:stretch>
+            <a:fillRect/>
+          </a:stretch>
+        </p:blipFill>
+        <p:spPr>
+          <a:xfrm>
+            <a:off x="4196954" y="3326875"/>
+            <a:ext cx="1339866" cy="1371600"/>
+          </a:xfrm>
+          <a:prstGeom prst="rect">
+            <a:avLst/>
+          </a:prstGeom>
+        </p:spPr>
+      </p:pic>
+      <p:pic>
+        <p:nvPicPr>
+          <p:cNvPr id="14" name="Picture 13" descr="A close - up of a window&#10;&#10;Description automatically generated with medium confidence">
+            <a:extLst>
+              <a:ext uri="{FF2B5EF4-FFF2-40B4-BE49-F238E27FC236}">
+                <a16:creationId xmlns:a16="http://schemas.microsoft.com/office/drawing/2014/main" id="{30A1798E-0BC3-46B2-AAB0-4BF741D39FA0}"/>
+              </a:ext>
+            </a:extLst>
+          </p:cNvPr>
+          <p:cNvPicPr>
+            <a:picLocks noChangeAspect="1"/>
+          </p:cNvPicPr>
+          <p:nvPr/>
+        </p:nvPicPr>
+        <p:blipFill>
+          <a:blip r:embed="rId8"/>
+          <a:stretch>
+            <a:fillRect/>
+          </a:stretch>
+        </p:blipFill>
+        <p:spPr>
+          <a:xfrm>
+            <a:off x="6760451" y="3326875"/>
+            <a:ext cx="1339866" cy="1371600"/>
+          </a:xfrm>
+          <a:prstGeom prst="rect">
+            <a:avLst/>
+          </a:prstGeom>
+        </p:spPr>
+      </p:pic>
     </p:spTree>
   </p:cSld>
   <p:clrMapOvr>
@@ -11002,13 +11567,40 @@
               <a:buFont typeface="Arial"/>
               <a:buNone/>
             </a:pPr>
-            <a:r>
-              <a:rPr lang="en-US" dirty="0"/>
-              <a:t>&lt;Insert HSV image here&gt;</a:t>
-            </a:r>
+            <a:endParaRPr lang="en-US" dirty="0"/>
           </a:p>
         </p:txBody>
       </p:sp>
+      <p:pic>
+        <p:nvPicPr>
+          <p:cNvPr id="3" name="Picture 2" descr="A picture containing colorful&#10;&#10;Description automatically generated">
+            <a:extLst>
+              <a:ext uri="{FF2B5EF4-FFF2-40B4-BE49-F238E27FC236}">
+                <a16:creationId xmlns:a16="http://schemas.microsoft.com/office/drawing/2014/main" id="{C45C3B98-1554-4C54-8169-9A3269A79C93}"/>
+              </a:ext>
+            </a:extLst>
+          </p:cNvPr>
+          <p:cNvPicPr>
+            <a:picLocks noChangeAspect="1"/>
+          </p:cNvPicPr>
+          <p:nvPr/>
+        </p:nvPicPr>
+        <p:blipFill>
+          <a:blip r:embed="rId3"/>
+          <a:stretch>
+            <a:fillRect/>
+          </a:stretch>
+        </p:blipFill>
+        <p:spPr>
+          <a:xfrm>
+            <a:off x="476596" y="1031875"/>
+            <a:ext cx="5486400" cy="3657600"/>
+          </a:xfrm>
+          <a:prstGeom prst="rect">
+            <a:avLst/>
+          </a:prstGeom>
+        </p:spPr>
+      </p:pic>
     </p:spTree>
   </p:cSld>
   <p:clrMapOvr>

</xml_diff>